<commit_message>
page 13 to undericted
</commit_message>
<xml_diff>
--- a/gephi_new_tutorial.pptx
+++ b/gephi_new_tutorial.pptx
@@ -300,7 +300,7 @@
           <a:p>
             <a:fld id="{655A5808-3B61-48CC-92EF-85AC2E0DFA56}" type="datetime2">
               <a:rPr lang="en-US" smtClean="0"/>
-              <a:t>Friday, March 5, 2021</a:t>
+              <a:t>Tuesday, March 1, 2022</a:t>
             </a:fld>
             <a:endParaRPr lang="en-US"/>
           </a:p>
@@ -498,7 +498,7 @@
           <a:p>
             <a:fld id="{735E98AF-4574-4509-BF7A-519ACD5BF826}" type="datetime2">
               <a:rPr lang="en-US" smtClean="0"/>
-              <a:t>Friday, March 5, 2021</a:t>
+              <a:t>Tuesday, March 1, 2022</a:t>
             </a:fld>
             <a:endParaRPr lang="en-US"/>
           </a:p>
@@ -708,7 +708,7 @@
           <a:p>
             <a:fld id="{93DD97D4-9636-490F-85D0-E926C2B6F3B1}" type="datetime2">
               <a:rPr lang="en-US" smtClean="0"/>
-              <a:t>Friday, March 5, 2021</a:t>
+              <a:t>Tuesday, March 1, 2022</a:t>
             </a:fld>
             <a:endParaRPr lang="en-US"/>
           </a:p>
@@ -907,7 +907,7 @@
           <a:p>
             <a:fld id="{2F3AF3C6-0FD4-4939-991C-00DDE5C56815}" type="datetime2">
               <a:rPr lang="en-US" smtClean="0"/>
-              <a:t>Friday, March 5, 2021</a:t>
+              <a:t>Tuesday, March 1, 2022</a:t>
             </a:fld>
             <a:endParaRPr lang="en-US"/>
           </a:p>
@@ -1188,7 +1188,7 @@
           <a:p>
             <a:fld id="{86807482-8128-47C6-A8DD-6452B0291CFF}" type="datetime2">
               <a:rPr lang="en-US" smtClean="0"/>
-              <a:t>Friday, March 5, 2021</a:t>
+              <a:t>Tuesday, March 1, 2022</a:t>
             </a:fld>
             <a:endParaRPr lang="en-US"/>
           </a:p>
@@ -1456,7 +1456,7 @@
           <a:p>
             <a:fld id="{37903F25-275E-41DE-BE3B-EBF0DB49F9B1}" type="datetime2">
               <a:rPr lang="en-US" smtClean="0"/>
-              <a:t>Friday, March 5, 2021</a:t>
+              <a:t>Tuesday, March 1, 2022</a:t>
             </a:fld>
             <a:endParaRPr lang="en-US"/>
           </a:p>
@@ -1837,7 +1837,7 @@
           <a:p>
             <a:fld id="{EE475572-4A44-4171-84AA-64D42C8050A6}" type="datetime2">
               <a:rPr lang="en-US" smtClean="0"/>
-              <a:t>Friday, March 5, 2021</a:t>
+              <a:t>Tuesday, March 1, 2022</a:t>
             </a:fld>
             <a:endParaRPr lang="en-US"/>
           </a:p>
@@ -2007,7 +2007,7 @@
           <a:p>
             <a:fld id="{C4C1612E-528E-4FD5-9E9E-E15F1108F171}" type="datetime2">
               <a:rPr lang="en-US" smtClean="0"/>
-              <a:t>Friday, March 5, 2021</a:t>
+              <a:t>Tuesday, March 1, 2022</a:t>
             </a:fld>
             <a:endParaRPr lang="en-US"/>
           </a:p>
@@ -2120,7 +2120,7 @@
           <a:p>
             <a:fld id="{D4F6D862-A06D-436F-A92E-EBAAD50B6E50}" type="datetime2">
               <a:rPr lang="en-US" smtClean="0"/>
-              <a:t>Friday, March 5, 2021</a:t>
+              <a:t>Tuesday, March 1, 2022</a:t>
             </a:fld>
             <a:endParaRPr lang="en-US"/>
           </a:p>
@@ -2437,7 +2437,7 @@
           <a:p>
             <a:fld id="{B73E0B7D-2260-4809-8F0A-9E5F3E24F169}" type="datetime2">
               <a:rPr lang="en-US" smtClean="0"/>
-              <a:t>Friday, March 5, 2021</a:t>
+              <a:t>Tuesday, March 1, 2022</a:t>
             </a:fld>
             <a:endParaRPr lang="en-US"/>
           </a:p>
@@ -2729,7 +2729,7 @@
           <a:p>
             <a:fld id="{3C8E4735-C637-46A3-94EB-AB3AC4188D2F}" type="datetime2">
               <a:rPr lang="en-US" smtClean="0"/>
-              <a:t>Friday, March 5, 2021</a:t>
+              <a:t>Tuesday, March 1, 2022</a:t>
             </a:fld>
             <a:endParaRPr lang="en-US"/>
           </a:p>
@@ -3097,7 +3097,7 @@
             <a:fld id="{AE0C963C-C1DB-4AFD-9DDC-0691666BF49B}" type="datetime2">
               <a:rPr lang="en-US" smtClean="0"/>
               <a:pPr/>
-              <a:t>Friday, March 5, 2021</a:t>
+              <a:t>Tuesday, March 1, 2022</a:t>
             </a:fld>
             <a:endParaRPr lang="en-US" cap="all" dirty="0"/>
           </a:p>
@@ -8329,7 +8329,15 @@
           <a:p>
             <a:r>
               <a:rPr lang="en-US" sz="1600" dirty="0"/>
-              <a:t>Select “Directed” and click on OK to compute the metric</a:t>
+              <a:t>Select “</a:t>
+            </a:r>
+            <a:r>
+              <a:rPr lang="en-US" altLang="zh-CN" sz="1600" dirty="0"/>
+              <a:t>Und</a:t>
+            </a:r>
+            <a:r>
+              <a:rPr lang="en-US" sz="1600" dirty="0"/>
+              <a:t>irected” and click on OK to compute the metric</a:t>
             </a:r>
           </a:p>
         </p:txBody>

</xml_diff>